<commit_message>
Updated Neurograph Presentation Files;
</commit_message>
<xml_diff>
--- a/Neurograph Project Presentation/Neurograph Presentation Jiashu Wu.pptx
+++ b/Neurograph Project Presentation/Neurograph Presentation Jiashu Wu.pptx
@@ -6430,7 +6430,10 @@
           <a:bodyPr/>
           <a:lstStyle/>
           <a:p>
-            <a:endParaRPr lang="en-AU"/>
+            <a:r>
+              <a:rPr lang="en-AU" dirty="0"/>
+              <a:t>After getting the drawing inputs, it will be stored in files in different format. </a:t>
+            </a:r>
           </a:p>
         </p:txBody>
       </p:sp>

</xml_diff>